<commit_message>
[android] Update document samples
</commit_message>
<xml_diff>
--- a/app_manager/appmanager/src/main/assets/samples/ONLYOFFICE Sample Presentation.pptx
+++ b/app_manager/appmanager/src/main/assets/samples/ONLYOFFICE Sample Presentation.pptx
@@ -1,6 +1,6 @@
 
 <file path=ppt/presentation.xml><?xml version="1.0" encoding="utf-8"?>
-<p:presentation xmlns:a="http://schemas.openxmlformats.org/drawingml/2006/main" xmlns:r="http://schemas.openxmlformats.org/officeDocument/2006/relationships" xmlns:p="http://schemas.openxmlformats.org/presentationml/2006/main" xmlns:m="http://schemas.openxmlformats.org/officeDocument/2006/math" xmlns:w="http://schemas.openxmlformats.org/wordprocessingml/2006/main" saveSubsetFonts="1">
+<p:presentation xmlns:a="http://schemas.openxmlformats.org/drawingml/2006/main" xmlns:r="http://schemas.openxmlformats.org/officeDocument/2006/relationships" xmlns:p="http://schemas.openxmlformats.org/presentationml/2006/main" saveSubsetFonts="1">
   <p:sldMasterIdLst>
     <p:sldMasterId id="2147483648" r:id="rId1"/>
   </p:sldMasterIdLst>
@@ -287,7 +287,7 @@
 </file>
 
 <file path=ppt/notesSlides/notesSlide1.xml><?xml version="1.0" encoding="utf-8"?>
-<p:notes xmlns:a="http://schemas.openxmlformats.org/drawingml/2006/main" xmlns:r="http://schemas.openxmlformats.org/officeDocument/2006/relationships" xmlns:p="http://schemas.openxmlformats.org/presentationml/2006/main" xmlns:m="http://schemas.openxmlformats.org/officeDocument/2006/math" xmlns:w="http://schemas.openxmlformats.org/wordprocessingml/2006/main">
+<p:notes xmlns:a="http://schemas.openxmlformats.org/drawingml/2006/main" xmlns:r="http://schemas.openxmlformats.org/officeDocument/2006/relationships" xmlns:p="http://schemas.openxmlformats.org/presentationml/2006/main">
   <p:cSld>
     <p:spTree>
       <p:nvGrpSpPr>
@@ -333,7 +333,7 @@
 </file>
 
 <file path=ppt/notesSlides/notesSlide2.xml><?xml version="1.0" encoding="utf-8"?>
-<p:notes xmlns:a="http://schemas.openxmlformats.org/drawingml/2006/main" xmlns:r="http://schemas.openxmlformats.org/officeDocument/2006/relationships" xmlns:p="http://schemas.openxmlformats.org/presentationml/2006/main" xmlns:m="http://schemas.openxmlformats.org/officeDocument/2006/math" xmlns:w="http://schemas.openxmlformats.org/wordprocessingml/2006/main">
+<p:notes xmlns:a="http://schemas.openxmlformats.org/drawingml/2006/main" xmlns:r="http://schemas.openxmlformats.org/officeDocument/2006/relationships" xmlns:p="http://schemas.openxmlformats.org/presentationml/2006/main">
   <p:cSld>
     <p:spTree>
       <p:nvGrpSpPr>
@@ -379,7 +379,7 @@
 </file>
 
 <file path=ppt/notesSlides/notesSlide3.xml><?xml version="1.0" encoding="utf-8"?>
-<p:notes xmlns:a="http://schemas.openxmlformats.org/drawingml/2006/main" xmlns:r="http://schemas.openxmlformats.org/officeDocument/2006/relationships" xmlns:p="http://schemas.openxmlformats.org/presentationml/2006/main" xmlns:m="http://schemas.openxmlformats.org/officeDocument/2006/math" xmlns:w="http://schemas.openxmlformats.org/wordprocessingml/2006/main">
+<p:notes xmlns:a="http://schemas.openxmlformats.org/drawingml/2006/main" xmlns:r="http://schemas.openxmlformats.org/officeDocument/2006/relationships" xmlns:p="http://schemas.openxmlformats.org/presentationml/2006/main">
   <p:cSld>
     <p:spTree>
       <p:nvGrpSpPr>
@@ -425,7 +425,7 @@
 </file>
 
 <file path=ppt/notesSlides/notesSlide4.xml><?xml version="1.0" encoding="utf-8"?>
-<p:notes xmlns:a="http://schemas.openxmlformats.org/drawingml/2006/main" xmlns:r="http://schemas.openxmlformats.org/officeDocument/2006/relationships" xmlns:p="http://schemas.openxmlformats.org/presentationml/2006/main" xmlns:m="http://schemas.openxmlformats.org/officeDocument/2006/math" xmlns:w="http://schemas.openxmlformats.org/wordprocessingml/2006/main">
+<p:notes xmlns:a="http://schemas.openxmlformats.org/drawingml/2006/main" xmlns:r="http://schemas.openxmlformats.org/officeDocument/2006/relationships" xmlns:p="http://schemas.openxmlformats.org/presentationml/2006/main">
   <p:cSld>
     <p:spTree>
       <p:nvGrpSpPr>
@@ -471,7 +471,7 @@
 </file>
 
 <file path=ppt/notesSlides/notesSlide5.xml><?xml version="1.0" encoding="utf-8"?>
-<p:notes xmlns:a="http://schemas.openxmlformats.org/drawingml/2006/main" xmlns:r="http://schemas.openxmlformats.org/officeDocument/2006/relationships" xmlns:p="http://schemas.openxmlformats.org/presentationml/2006/main" xmlns:m="http://schemas.openxmlformats.org/officeDocument/2006/math" xmlns:w="http://schemas.openxmlformats.org/wordprocessingml/2006/main">
+<p:notes xmlns:a="http://schemas.openxmlformats.org/drawingml/2006/main" xmlns:r="http://schemas.openxmlformats.org/officeDocument/2006/relationships" xmlns:p="http://schemas.openxmlformats.org/presentationml/2006/main">
   <p:cSld>
     <p:spTree>
       <p:nvGrpSpPr>
@@ -517,7 +517,7 @@
 </file>
 
 <file path=ppt/notesSlides/notesSlide6.xml><?xml version="1.0" encoding="utf-8"?>
-<p:notes xmlns:a="http://schemas.openxmlformats.org/drawingml/2006/main" xmlns:r="http://schemas.openxmlformats.org/officeDocument/2006/relationships" xmlns:p="http://schemas.openxmlformats.org/presentationml/2006/main" xmlns:m="http://schemas.openxmlformats.org/officeDocument/2006/math" xmlns:w="http://schemas.openxmlformats.org/wordprocessingml/2006/main">
+<p:notes xmlns:a="http://schemas.openxmlformats.org/drawingml/2006/main" xmlns:r="http://schemas.openxmlformats.org/officeDocument/2006/relationships" xmlns:p="http://schemas.openxmlformats.org/presentationml/2006/main">
   <p:cSld>
     <p:spTree>
       <p:nvGrpSpPr>
@@ -563,7 +563,7 @@
 </file>
 
 <file path=ppt/notesSlides/notesSlide7.xml><?xml version="1.0" encoding="utf-8"?>
-<p:notes xmlns:a="http://schemas.openxmlformats.org/drawingml/2006/main" xmlns:r="http://schemas.openxmlformats.org/officeDocument/2006/relationships" xmlns:p="http://schemas.openxmlformats.org/presentationml/2006/main" xmlns:m="http://schemas.openxmlformats.org/officeDocument/2006/math" xmlns:w="http://schemas.openxmlformats.org/wordprocessingml/2006/main">
+<p:notes xmlns:a="http://schemas.openxmlformats.org/drawingml/2006/main" xmlns:r="http://schemas.openxmlformats.org/officeDocument/2006/relationships" xmlns:p="http://schemas.openxmlformats.org/presentationml/2006/main">
   <p:cSld>
     <p:spTree>
       <p:nvGrpSpPr>
@@ -609,7 +609,7 @@
 </file>
 
 <file path=ppt/notesSlides/notesSlide8.xml><?xml version="1.0" encoding="utf-8"?>
-<p:notes xmlns:a="http://schemas.openxmlformats.org/drawingml/2006/main" xmlns:r="http://schemas.openxmlformats.org/officeDocument/2006/relationships" xmlns:p="http://schemas.openxmlformats.org/presentationml/2006/main" xmlns:m="http://schemas.openxmlformats.org/officeDocument/2006/math" xmlns:w="http://schemas.openxmlformats.org/wordprocessingml/2006/main">
+<p:notes xmlns:a="http://schemas.openxmlformats.org/drawingml/2006/main" xmlns:r="http://schemas.openxmlformats.org/officeDocument/2006/relationships" xmlns:p="http://schemas.openxmlformats.org/presentationml/2006/main">
   <p:cSld>
     <p:spTree>
       <p:nvGrpSpPr>
@@ -655,11 +655,11 @@
 </file>
 
 <file path=ppt/slideLayouts/slideLayout1.xml><?xml version="1.0" encoding="utf-8"?>
-<p:sldLayout xmlns:a="http://schemas.openxmlformats.org/drawingml/2006/main" xmlns:r="http://schemas.openxmlformats.org/officeDocument/2006/relationships" xmlns:p="http://schemas.openxmlformats.org/presentationml/2006/main" xmlns:m="http://schemas.openxmlformats.org/officeDocument/2006/math" xmlns:w="http://schemas.openxmlformats.org/wordprocessingml/2006/main" matchingName="" preserve="1" showMasterPhAnim="0" userDrawn="1">
+<p:sldLayout xmlns:a="http://schemas.openxmlformats.org/drawingml/2006/main" xmlns:r="http://schemas.openxmlformats.org/officeDocument/2006/relationships" xmlns:p="http://schemas.openxmlformats.org/presentationml/2006/main" matchingName="" preserve="1" showMasterPhAnim="0" userDrawn="1">
   <p:cSld name="Title Slide">
     <p:spTree>
       <p:nvGrpSpPr>
-        <p:cNvPr id="1" name="" hidden="0"/>
+        <p:cNvPr id="1" name=""/>
         <p:cNvGrpSpPr/>
         <p:nvPr isPhoto="0" userDrawn="0"/>
       </p:nvGrpSpPr>
@@ -673,7 +673,7 @@
       </p:grpSpPr>
       <p:sp>
         <p:nvSpPr>
-          <p:cNvPr id="2" name="Title 1" hidden="0"/>
+          <p:cNvPr id="2" name="Title 1"/>
           <p:cNvSpPr/>
           <p:nvPr isPhoto="0" userDrawn="0">
             <p:ph type="ctrTitle" hasCustomPrompt="0"/>
@@ -706,7 +706,7 @@
       </p:sp>
       <p:sp>
         <p:nvSpPr>
-          <p:cNvPr id="4" name="Date Placeholder 3" hidden="0"/>
+          <p:cNvPr id="4" name="Date Placeholder 3"/>
           <p:cNvSpPr/>
           <p:nvPr isPhoto="0" userDrawn="0">
             <p:ph type="dt" sz="half" idx="10" hasCustomPrompt="0"/>
@@ -723,17 +723,13 @@
             <a:fld id="{8EC678CE-9857-4734-9115-53321CEB7787}" type="datetimeFigureOut">
               <a:t>3/27/2014</a:t>
             </a:fld>
-            <a:r>
-              <a:rPr/>
-              <a:t>27.03.201424.06.201413.08.201418.08.2014</a:t>
-            </a:r>
-            <a:endParaRPr/>
-          </a:p>
-        </p:txBody>
-      </p:sp>
-      <p:sp>
-        <p:nvSpPr>
-          <p:cNvPr id="5" name="Footer Placeholder 4" hidden="0"/>
+            <a:endParaRPr/>
+          </a:p>
+        </p:txBody>
+      </p:sp>
+      <p:sp>
+        <p:nvSpPr>
+          <p:cNvPr id="5" name="Footer Placeholder 4"/>
           <p:cNvSpPr/>
           <p:nvPr isPhoto="0" userDrawn="0">
             <p:ph type="ftr" sz="quarter" idx="11" hasCustomPrompt="0"/>
@@ -753,7 +749,7 @@
       </p:sp>
       <p:sp>
         <p:nvSpPr>
-          <p:cNvPr id="6" name="Slide Number Placeholder 5" hidden="0"/>
+          <p:cNvPr id="6" name="Slide Number Placeholder 5"/>
           <p:cNvSpPr/>
           <p:nvPr isPhoto="0" userDrawn="0">
             <p:ph type="sldNum" sz="quarter" idx="12" hasCustomPrompt="0"/>
@@ -779,16 +775,15 @@
   <p:clrMapOvr>
     <a:masterClrMapping/>
   </p:clrMapOvr>
-  <p:hf dt="1" ftr="1" hdr="1" sldNum="1"/>
 </p:sldLayout>
 </file>
 
 <file path=ppt/slideLayouts/slideLayout10.xml><?xml version="1.0" encoding="utf-8"?>
-<p:sldLayout xmlns:a="http://schemas.openxmlformats.org/drawingml/2006/main" xmlns:r="http://schemas.openxmlformats.org/officeDocument/2006/relationships" xmlns:p="http://schemas.openxmlformats.org/presentationml/2006/main" xmlns:m="http://schemas.openxmlformats.org/officeDocument/2006/math" xmlns:w="http://schemas.openxmlformats.org/wordprocessingml/2006/main" matchingName="" preserve="1" showMasterPhAnim="0" type="blank" userDrawn="1">
+<p:sldLayout xmlns:a="http://schemas.openxmlformats.org/drawingml/2006/main" xmlns:r="http://schemas.openxmlformats.org/officeDocument/2006/relationships" xmlns:p="http://schemas.openxmlformats.org/presentationml/2006/main" matchingName="" preserve="1" showMasterPhAnim="0" type="blank" userDrawn="1">
   <p:cSld name="Title and Vertical Text">
     <p:spTree>
       <p:nvGrpSpPr>
-        <p:cNvPr id="1" name="" hidden="0"/>
+        <p:cNvPr id="1" name=""/>
         <p:cNvGrpSpPr/>
         <p:nvPr isPhoto="0" userDrawn="0"/>
       </p:nvGrpSpPr>
@@ -802,7 +797,7 @@
       </p:grpSpPr>
       <p:sp>
         <p:nvSpPr>
-          <p:cNvPr id="2" name="Title 1" hidden="0"/>
+          <p:cNvPr id="2" name="Title 1"/>
           <p:cNvSpPr/>
           <p:nvPr isPhoto="0" userDrawn="0">
             <p:ph type="title" hasCustomPrompt="0"/>
@@ -826,7 +821,7 @@
       </p:sp>
       <p:sp>
         <p:nvSpPr>
-          <p:cNvPr id="3" name="Vertical Text Placeholder 2" hidden="0"/>
+          <p:cNvPr id="3" name="Vertical Text Placeholder 2"/>
           <p:cNvSpPr/>
           <p:nvPr isPhoto="0" userDrawn="0">
             <p:ph type="body" orient="vert" idx="1" hasCustomPrompt="0"/>
@@ -890,7 +885,7 @@
       </p:sp>
       <p:sp>
         <p:nvSpPr>
-          <p:cNvPr id="4" name="Date Placeholder 3" hidden="0"/>
+          <p:cNvPr id="4" name="Date Placeholder 3"/>
           <p:cNvSpPr/>
           <p:nvPr isPhoto="0" userDrawn="0">
             <p:ph type="dt" sz="half" idx="10" hasCustomPrompt="0"/>
@@ -907,17 +902,13 @@
             <a:fld id="{8EC678CE-9857-4734-9115-53321CEB7787}" type="datetimeFigureOut">
               <a:t>3/27/2014</a:t>
             </a:fld>
-            <a:r>
-              <a:rPr/>
-              <a:t>27.03.201424.06.201413.08.201418.08.2014</a:t>
-            </a:r>
-            <a:endParaRPr/>
-          </a:p>
-        </p:txBody>
-      </p:sp>
-      <p:sp>
-        <p:nvSpPr>
-          <p:cNvPr id="5" name="Footer Placeholder 4" hidden="0"/>
+            <a:endParaRPr/>
+          </a:p>
+        </p:txBody>
+      </p:sp>
+      <p:sp>
+        <p:nvSpPr>
+          <p:cNvPr id="5" name="Footer Placeholder 4"/>
           <p:cNvSpPr/>
           <p:nvPr isPhoto="0" userDrawn="0">
             <p:ph type="ftr" sz="quarter" idx="11" hasCustomPrompt="0"/>
@@ -937,7 +928,7 @@
       </p:sp>
       <p:sp>
         <p:nvSpPr>
-          <p:cNvPr id="6" name="Slide Number Placeholder 5" hidden="0"/>
+          <p:cNvPr id="6" name="Slide Number Placeholder 5"/>
           <p:cNvSpPr/>
           <p:nvPr isPhoto="0" userDrawn="0">
             <p:ph type="sldNum" sz="quarter" idx="12" hasCustomPrompt="0"/>
@@ -963,16 +954,15 @@
   <p:clrMapOvr>
     <a:masterClrMapping/>
   </p:clrMapOvr>
-  <p:hf dt="1" ftr="1" hdr="1" sldNum="1"/>
 </p:sldLayout>
 </file>
 
 <file path=ppt/slideLayouts/slideLayout11.xml><?xml version="1.0" encoding="utf-8"?>
-<p:sldLayout xmlns:a="http://schemas.openxmlformats.org/drawingml/2006/main" xmlns:r="http://schemas.openxmlformats.org/officeDocument/2006/relationships" xmlns:p="http://schemas.openxmlformats.org/presentationml/2006/main" xmlns:m="http://schemas.openxmlformats.org/officeDocument/2006/math" xmlns:w="http://schemas.openxmlformats.org/wordprocessingml/2006/main" matchingName="" preserve="1" showMasterPhAnim="0" type="blank" userDrawn="1">
+<p:sldLayout xmlns:a="http://schemas.openxmlformats.org/drawingml/2006/main" xmlns:r="http://schemas.openxmlformats.org/officeDocument/2006/relationships" xmlns:p="http://schemas.openxmlformats.org/presentationml/2006/main" matchingName="" preserve="1" showMasterPhAnim="0" type="blank" userDrawn="1">
   <p:cSld name="Vertical Title and Text">
     <p:spTree>
       <p:nvGrpSpPr>
-        <p:cNvPr id="1" name="" hidden="0"/>
+        <p:cNvPr id="1" name=""/>
         <p:cNvGrpSpPr/>
         <p:nvPr isPhoto="0" userDrawn="0"/>
       </p:nvGrpSpPr>
@@ -986,7 +976,7 @@
       </p:grpSpPr>
       <p:sp>
         <p:nvSpPr>
-          <p:cNvPr id="2" name="Vertical Title 1" hidden="0"/>
+          <p:cNvPr id="2" name="Vertical Title 1"/>
           <p:cNvSpPr/>
           <p:nvPr isPhoto="0" userDrawn="0">
             <p:ph type="title" orient="vert" hasCustomPrompt="0"/>
@@ -1015,7 +1005,7 @@
       </p:sp>
       <p:sp>
         <p:nvSpPr>
-          <p:cNvPr id="3" name="Vertical Text Placeholder 2" hidden="0"/>
+          <p:cNvPr id="3" name="Vertical Text Placeholder 2"/>
           <p:cNvSpPr/>
           <p:nvPr isPhoto="0" userDrawn="0">
             <p:ph type="body" orient="vert" idx="1" hasCustomPrompt="0"/>
@@ -1084,7 +1074,7 @@
       </p:sp>
       <p:sp>
         <p:nvSpPr>
-          <p:cNvPr id="4" name="Date Placeholder 3" hidden="0"/>
+          <p:cNvPr id="4" name="Date Placeholder 3"/>
           <p:cNvSpPr/>
           <p:nvPr isPhoto="0" userDrawn="0">
             <p:ph type="dt" sz="half" idx="10" hasCustomPrompt="0"/>
@@ -1101,17 +1091,13 @@
             <a:fld id="{8EC678CE-9857-4734-9115-53321CEB7787}" type="datetimeFigureOut">
               <a:t>3/27/2014</a:t>
             </a:fld>
-            <a:r>
-              <a:rPr/>
-              <a:t>27.03.201424.06.201413.08.201418.08.2014</a:t>
-            </a:r>
-            <a:endParaRPr/>
-          </a:p>
-        </p:txBody>
-      </p:sp>
-      <p:sp>
-        <p:nvSpPr>
-          <p:cNvPr id="5" name="Footer Placeholder 4" hidden="0"/>
+            <a:endParaRPr/>
+          </a:p>
+        </p:txBody>
+      </p:sp>
+      <p:sp>
+        <p:nvSpPr>
+          <p:cNvPr id="5" name="Footer Placeholder 4"/>
           <p:cNvSpPr/>
           <p:nvPr isPhoto="0" userDrawn="0">
             <p:ph type="ftr" sz="quarter" idx="11" hasCustomPrompt="0"/>
@@ -1131,7 +1117,7 @@
       </p:sp>
       <p:sp>
         <p:nvSpPr>
-          <p:cNvPr id="6" name="Slide Number Placeholder 5" hidden="0"/>
+          <p:cNvPr id="6" name="Slide Number Placeholder 5"/>
           <p:cNvSpPr/>
           <p:nvPr isPhoto="0" userDrawn="0">
             <p:ph type="sldNum" sz="quarter" idx="12" hasCustomPrompt="0"/>
@@ -1157,16 +1143,15 @@
   <p:clrMapOvr>
     <a:masterClrMapping/>
   </p:clrMapOvr>
-  <p:hf dt="1" ftr="1" hdr="1" sldNum="1"/>
 </p:sldLayout>
 </file>
 
 <file path=ppt/slideLayouts/slideLayout2.xml><?xml version="1.0" encoding="utf-8"?>
-<p:sldLayout xmlns:a="http://schemas.openxmlformats.org/drawingml/2006/main" xmlns:r="http://schemas.openxmlformats.org/officeDocument/2006/relationships" xmlns:p="http://schemas.openxmlformats.org/presentationml/2006/main" xmlns:m="http://schemas.openxmlformats.org/officeDocument/2006/math" xmlns:w="http://schemas.openxmlformats.org/wordprocessingml/2006/main" matchingName="" preserve="1" showMasterPhAnim="0" type="blank" userDrawn="1">
+<p:sldLayout xmlns:a="http://schemas.openxmlformats.org/drawingml/2006/main" xmlns:r="http://schemas.openxmlformats.org/officeDocument/2006/relationships" xmlns:p="http://schemas.openxmlformats.org/presentationml/2006/main" matchingName="" preserve="1" showMasterPhAnim="0" type="blank" userDrawn="1">
   <p:cSld name="Title and Content">
     <p:spTree>
       <p:nvGrpSpPr>
-        <p:cNvPr id="1" name="" hidden="0"/>
+        <p:cNvPr id="1" name=""/>
         <p:cNvGrpSpPr/>
         <p:nvPr isPhoto="0" userDrawn="0"/>
       </p:nvGrpSpPr>
@@ -1180,7 +1165,7 @@
       </p:grpSpPr>
       <p:sp>
         <p:nvSpPr>
-          <p:cNvPr id="2" name="Title 1" hidden="0"/>
+          <p:cNvPr id="2" name="Title 1"/>
           <p:cNvSpPr/>
           <p:nvPr isPhoto="0" userDrawn="0">
             <p:ph type="title" hasCustomPrompt="0"/>
@@ -1204,7 +1189,7 @@
       </p:sp>
       <p:sp>
         <p:nvSpPr>
-          <p:cNvPr id="3" name="Content Placeholder 2" hidden="0"/>
+          <p:cNvPr id="3" name="Content Placeholder 2"/>
           <p:cNvSpPr/>
           <p:nvPr isPhoto="0" userDrawn="0">
             <p:ph idx="1" hasCustomPrompt="0"/>
@@ -1268,7 +1253,7 @@
       </p:sp>
       <p:sp>
         <p:nvSpPr>
-          <p:cNvPr id="4" name="Date Placeholder 3" hidden="0"/>
+          <p:cNvPr id="4" name="Date Placeholder 3"/>
           <p:cNvSpPr/>
           <p:nvPr isPhoto="0" userDrawn="0">
             <p:ph type="dt" sz="half" idx="10" hasCustomPrompt="0"/>
@@ -1285,17 +1270,13 @@
             <a:fld id="{8EC678CE-9857-4734-9115-53321CEB7787}" type="datetimeFigureOut">
               <a:t>3/27/2014</a:t>
             </a:fld>
-            <a:r>
-              <a:rPr/>
-              <a:t>27.03.201424.06.201413.08.201418.08.2014</a:t>
-            </a:r>
-            <a:endParaRPr/>
-          </a:p>
-        </p:txBody>
-      </p:sp>
-      <p:sp>
-        <p:nvSpPr>
-          <p:cNvPr id="5" name="Footer Placeholder 4" hidden="0"/>
+            <a:endParaRPr/>
+          </a:p>
+        </p:txBody>
+      </p:sp>
+      <p:sp>
+        <p:nvSpPr>
+          <p:cNvPr id="5" name="Footer Placeholder 4"/>
           <p:cNvSpPr/>
           <p:nvPr isPhoto="0" userDrawn="0">
             <p:ph type="ftr" sz="quarter" idx="11" hasCustomPrompt="0"/>
@@ -1315,7 +1296,7 @@
       </p:sp>
       <p:sp>
         <p:nvSpPr>
-          <p:cNvPr id="6" name="Slide Number Placeholder 5" hidden="0"/>
+          <p:cNvPr id="6" name="Slide Number Placeholder 5"/>
           <p:cNvSpPr/>
           <p:nvPr isPhoto="0" userDrawn="0">
             <p:ph type="sldNum" sz="quarter" idx="12" hasCustomPrompt="0"/>
@@ -1341,16 +1322,15 @@
   <p:clrMapOvr>
     <a:masterClrMapping/>
   </p:clrMapOvr>
-  <p:hf dt="1" ftr="1" hdr="1" sldNum="1"/>
 </p:sldLayout>
 </file>
 
 <file path=ppt/slideLayouts/slideLayout3.xml><?xml version="1.0" encoding="utf-8"?>
-<p:sldLayout xmlns:a="http://schemas.openxmlformats.org/drawingml/2006/main" xmlns:r="http://schemas.openxmlformats.org/officeDocument/2006/relationships" xmlns:p="http://schemas.openxmlformats.org/presentationml/2006/main" xmlns:m="http://schemas.openxmlformats.org/officeDocument/2006/math" xmlns:w="http://schemas.openxmlformats.org/wordprocessingml/2006/main" matchingName="" preserve="1" showMasterPhAnim="0" type="blank" userDrawn="1">
+<p:sldLayout xmlns:a="http://schemas.openxmlformats.org/drawingml/2006/main" xmlns:r="http://schemas.openxmlformats.org/officeDocument/2006/relationships" xmlns:p="http://schemas.openxmlformats.org/presentationml/2006/main" matchingName="" preserve="1" showMasterPhAnim="0" type="blank" userDrawn="1">
   <p:cSld name="Section Header">
     <p:spTree>
       <p:nvGrpSpPr>
-        <p:cNvPr id="1" name="" hidden="0"/>
+        <p:cNvPr id="1" name=""/>
         <p:cNvGrpSpPr/>
         <p:nvPr isPhoto="0" userDrawn="0"/>
       </p:nvGrpSpPr>
@@ -1364,7 +1344,7 @@
       </p:grpSpPr>
       <p:sp>
         <p:nvSpPr>
-          <p:cNvPr id="2" name="Title 1" hidden="0"/>
+          <p:cNvPr id="2" name="Title 1"/>
           <p:cNvSpPr/>
           <p:nvPr isPhoto="0" userDrawn="0">
             <p:ph type="title" hasCustomPrompt="0"/>
@@ -1397,7 +1377,7 @@
       </p:sp>
       <p:sp>
         <p:nvSpPr>
-          <p:cNvPr id="3" name="Text Placeholder 2" hidden="0"/>
+          <p:cNvPr id="3" name="Text Placeholder 2"/>
           <p:cNvSpPr/>
           <p:nvPr isPhoto="0" userDrawn="0">
             <p:ph type="body" idx="1" hasCustomPrompt="0"/>
@@ -1515,7 +1495,7 @@
       </p:sp>
       <p:sp>
         <p:nvSpPr>
-          <p:cNvPr id="4" name="Date Placeholder 3" hidden="0"/>
+          <p:cNvPr id="4" name="Date Placeholder 3"/>
           <p:cNvSpPr/>
           <p:nvPr isPhoto="0" userDrawn="0">
             <p:ph type="dt" sz="half" idx="10" hasCustomPrompt="0"/>
@@ -1532,17 +1512,13 @@
             <a:fld id="{8EC678CE-9857-4734-9115-53321CEB7787}" type="datetimeFigureOut">
               <a:t>3/27/2014</a:t>
             </a:fld>
-            <a:r>
-              <a:rPr/>
-              <a:t>27.03.201424.06.201413.08.201418.08.2014</a:t>
-            </a:r>
-            <a:endParaRPr/>
-          </a:p>
-        </p:txBody>
-      </p:sp>
-      <p:sp>
-        <p:nvSpPr>
-          <p:cNvPr id="5" name="Footer Placeholder 4" hidden="0"/>
+            <a:endParaRPr/>
+          </a:p>
+        </p:txBody>
+      </p:sp>
+      <p:sp>
+        <p:nvSpPr>
+          <p:cNvPr id="5" name="Footer Placeholder 4"/>
           <p:cNvSpPr/>
           <p:nvPr isPhoto="0" userDrawn="0">
             <p:ph type="ftr" sz="quarter" idx="11" hasCustomPrompt="0"/>
@@ -1562,7 +1538,7 @@
       </p:sp>
       <p:sp>
         <p:nvSpPr>
-          <p:cNvPr id="6" name="Slide Number Placeholder 5" hidden="0"/>
+          <p:cNvPr id="6" name="Slide Number Placeholder 5"/>
           <p:cNvSpPr/>
           <p:nvPr isPhoto="0" userDrawn="0">
             <p:ph type="sldNum" sz="quarter" idx="12" hasCustomPrompt="0"/>
@@ -1588,16 +1564,15 @@
   <p:clrMapOvr>
     <a:masterClrMapping/>
   </p:clrMapOvr>
-  <p:hf dt="1" ftr="1" hdr="1" sldNum="1"/>
 </p:sldLayout>
 </file>
 
 <file path=ppt/slideLayouts/slideLayout4.xml><?xml version="1.0" encoding="utf-8"?>
-<p:sldLayout xmlns:a="http://schemas.openxmlformats.org/drawingml/2006/main" xmlns:r="http://schemas.openxmlformats.org/officeDocument/2006/relationships" xmlns:p="http://schemas.openxmlformats.org/presentationml/2006/main" xmlns:m="http://schemas.openxmlformats.org/officeDocument/2006/math" xmlns:w="http://schemas.openxmlformats.org/wordprocessingml/2006/main" matchingName="" preserve="1" showMasterPhAnim="0" type="blank" userDrawn="1">
+<p:sldLayout xmlns:a="http://schemas.openxmlformats.org/drawingml/2006/main" xmlns:r="http://schemas.openxmlformats.org/officeDocument/2006/relationships" xmlns:p="http://schemas.openxmlformats.org/presentationml/2006/main" matchingName="" preserve="1" showMasterPhAnim="0" type="blank" userDrawn="1">
   <p:cSld name="Two Content">
     <p:spTree>
       <p:nvGrpSpPr>
-        <p:cNvPr id="1" name="" hidden="0"/>
+        <p:cNvPr id="1" name=""/>
         <p:cNvGrpSpPr/>
         <p:nvPr isPhoto="0" userDrawn="0"/>
       </p:nvGrpSpPr>
@@ -1611,7 +1586,7 @@
       </p:grpSpPr>
       <p:sp>
         <p:nvSpPr>
-          <p:cNvPr id="2" name="Title 1" hidden="0"/>
+          <p:cNvPr id="2" name="Title 1"/>
           <p:cNvSpPr/>
           <p:nvPr isPhoto="0" userDrawn="0">
             <p:ph type="title" hasCustomPrompt="0"/>
@@ -1635,7 +1610,7 @@
       </p:sp>
       <p:sp>
         <p:nvSpPr>
-          <p:cNvPr id="3" name="Content Placeholder 2" hidden="0"/>
+          <p:cNvPr id="3" name="Content Placeholder 2"/>
           <p:cNvSpPr/>
           <p:nvPr isPhoto="0" userDrawn="0">
             <p:ph sz="half" idx="1" hasCustomPrompt="0"/>
@@ -1704,7 +1679,7 @@
       </p:sp>
       <p:sp>
         <p:nvSpPr>
-          <p:cNvPr id="4" name="Content Placeholder 3" hidden="0"/>
+          <p:cNvPr id="4" name="Content Placeholder 3"/>
           <p:cNvSpPr/>
           <p:nvPr isPhoto="0" userDrawn="0">
             <p:ph sz="half" idx="2" hasCustomPrompt="0"/>
@@ -1773,7 +1748,7 @@
       </p:sp>
       <p:sp>
         <p:nvSpPr>
-          <p:cNvPr id="5" name="Date Placeholder 4" hidden="0"/>
+          <p:cNvPr id="5" name="Date Placeholder 4"/>
           <p:cNvSpPr/>
           <p:nvPr isPhoto="0" userDrawn="0">
             <p:ph type="dt" sz="half" idx="10" hasCustomPrompt="0"/>
@@ -1790,17 +1765,13 @@
             <a:fld id="{8EC678CE-9857-4734-9115-53321CEB7787}" type="datetimeFigureOut">
               <a:t>3/27/2014</a:t>
             </a:fld>
-            <a:r>
-              <a:rPr/>
-              <a:t>27.03.201424.06.201413.08.201418.08.2014</a:t>
-            </a:r>
-            <a:endParaRPr/>
-          </a:p>
-        </p:txBody>
-      </p:sp>
-      <p:sp>
-        <p:nvSpPr>
-          <p:cNvPr id="6" name="Footer Placeholder 5" hidden="0"/>
+            <a:endParaRPr/>
+          </a:p>
+        </p:txBody>
+      </p:sp>
+      <p:sp>
+        <p:nvSpPr>
+          <p:cNvPr id="6" name="Footer Placeholder 5"/>
           <p:cNvSpPr/>
           <p:nvPr isPhoto="0" userDrawn="0">
             <p:ph type="ftr" sz="quarter" idx="11" hasCustomPrompt="0"/>
@@ -1820,7 +1791,7 @@
       </p:sp>
       <p:sp>
         <p:nvSpPr>
-          <p:cNvPr id="7" name="Slide Number Placeholder 6" hidden="0"/>
+          <p:cNvPr id="7" name="Slide Number Placeholder 6"/>
           <p:cNvSpPr/>
           <p:nvPr isPhoto="0" userDrawn="0">
             <p:ph type="sldNum" sz="quarter" idx="12" hasCustomPrompt="0"/>
@@ -1846,16 +1817,15 @@
   <p:clrMapOvr>
     <a:masterClrMapping/>
   </p:clrMapOvr>
-  <p:hf dt="1" ftr="1" hdr="1" sldNum="1"/>
 </p:sldLayout>
 </file>
 
 <file path=ppt/slideLayouts/slideLayout5.xml><?xml version="1.0" encoding="utf-8"?>
-<p:sldLayout xmlns:a="http://schemas.openxmlformats.org/drawingml/2006/main" xmlns:r="http://schemas.openxmlformats.org/officeDocument/2006/relationships" xmlns:p="http://schemas.openxmlformats.org/presentationml/2006/main" xmlns:m="http://schemas.openxmlformats.org/officeDocument/2006/math" xmlns:w="http://schemas.openxmlformats.org/wordprocessingml/2006/main" matchingName="" preserve="1" showMasterPhAnim="0" type="blank" userDrawn="1">
+<p:sldLayout xmlns:a="http://schemas.openxmlformats.org/drawingml/2006/main" xmlns:r="http://schemas.openxmlformats.org/officeDocument/2006/relationships" xmlns:p="http://schemas.openxmlformats.org/presentationml/2006/main" matchingName="" preserve="1" showMasterPhAnim="0" type="blank" userDrawn="1">
   <p:cSld name="Comparison">
     <p:spTree>
       <p:nvGrpSpPr>
-        <p:cNvPr id="1" name="" hidden="0"/>
+        <p:cNvPr id="1" name=""/>
         <p:cNvGrpSpPr/>
         <p:nvPr isPhoto="0" userDrawn="0"/>
       </p:nvGrpSpPr>
@@ -1869,7 +1839,7 @@
       </p:grpSpPr>
       <p:sp>
         <p:nvSpPr>
-          <p:cNvPr id="2" name="Title 1" hidden="0"/>
+          <p:cNvPr id="2" name="Title 1"/>
           <p:cNvSpPr/>
           <p:nvPr isPhoto="0" userDrawn="0">
             <p:ph type="title" hasCustomPrompt="0"/>
@@ -1898,7 +1868,7 @@
       </p:sp>
       <p:sp>
         <p:nvSpPr>
-          <p:cNvPr id="3" name="Text Placeholder 2" hidden="0"/>
+          <p:cNvPr id="3" name="Text Placeholder 2"/>
           <p:cNvSpPr/>
           <p:nvPr isPhoto="0" userDrawn="0">
             <p:ph type="body" idx="1" hasCustomPrompt="0"/>
@@ -1964,7 +1934,7 @@
       </p:sp>
       <p:sp>
         <p:nvSpPr>
-          <p:cNvPr id="4" name="Content Placeholder 3" hidden="0"/>
+          <p:cNvPr id="4" name="Content Placeholder 3"/>
           <p:cNvSpPr/>
           <p:nvPr isPhoto="0" userDrawn="0">
             <p:ph sz="half" idx="2" hasCustomPrompt="0"/>
@@ -2033,7 +2003,7 @@
       </p:sp>
       <p:sp>
         <p:nvSpPr>
-          <p:cNvPr id="5" name="Text Placeholder 4" hidden="0"/>
+          <p:cNvPr id="5" name="Text Placeholder 4"/>
           <p:cNvSpPr/>
           <p:nvPr isPhoto="0" userDrawn="0">
             <p:ph type="body" sz="quarter" idx="3" hasCustomPrompt="0"/>
@@ -2099,7 +2069,7 @@
       </p:sp>
       <p:sp>
         <p:nvSpPr>
-          <p:cNvPr id="6" name="Content Placeholder 5" hidden="0"/>
+          <p:cNvPr id="6" name="Content Placeholder 5"/>
           <p:cNvSpPr/>
           <p:nvPr isPhoto="0" userDrawn="0">
             <p:ph sz="quarter" idx="4" hasCustomPrompt="0"/>
@@ -2168,7 +2138,7 @@
       </p:sp>
       <p:sp>
         <p:nvSpPr>
-          <p:cNvPr id="7" name="Date Placeholder 6" hidden="0"/>
+          <p:cNvPr id="7" name="Date Placeholder 6"/>
           <p:cNvSpPr/>
           <p:nvPr isPhoto="0" userDrawn="0">
             <p:ph type="dt" sz="half" idx="10" hasCustomPrompt="0"/>
@@ -2185,17 +2155,13 @@
             <a:fld id="{8EC678CE-9857-4734-9115-53321CEB7787}" type="datetimeFigureOut">
               <a:t>3/27/2014</a:t>
             </a:fld>
-            <a:r>
-              <a:rPr/>
-              <a:t>27.03.201424.06.201413.08.201418.08.2014</a:t>
-            </a:r>
-            <a:endParaRPr/>
-          </a:p>
-        </p:txBody>
-      </p:sp>
-      <p:sp>
-        <p:nvSpPr>
-          <p:cNvPr id="8" name="Footer Placeholder 7" hidden="0"/>
+            <a:endParaRPr/>
+          </a:p>
+        </p:txBody>
+      </p:sp>
+      <p:sp>
+        <p:nvSpPr>
+          <p:cNvPr id="8" name="Footer Placeholder 7"/>
           <p:cNvSpPr/>
           <p:nvPr isPhoto="0" userDrawn="0">
             <p:ph type="ftr" sz="quarter" idx="11" hasCustomPrompt="0"/>
@@ -2215,7 +2181,7 @@
       </p:sp>
       <p:sp>
         <p:nvSpPr>
-          <p:cNvPr id="9" name="Slide Number Placeholder 8" hidden="0"/>
+          <p:cNvPr id="9" name="Slide Number Placeholder 8"/>
           <p:cNvSpPr/>
           <p:nvPr isPhoto="0" userDrawn="0">
             <p:ph type="sldNum" sz="quarter" idx="12" hasCustomPrompt="0"/>
@@ -2241,16 +2207,15 @@
   <p:clrMapOvr>
     <a:masterClrMapping/>
   </p:clrMapOvr>
-  <p:hf dt="1" ftr="1" hdr="1" sldNum="1"/>
 </p:sldLayout>
 </file>
 
 <file path=ppt/slideLayouts/slideLayout6.xml><?xml version="1.0" encoding="utf-8"?>
-<p:sldLayout xmlns:a="http://schemas.openxmlformats.org/drawingml/2006/main" xmlns:r="http://schemas.openxmlformats.org/officeDocument/2006/relationships" xmlns:p="http://schemas.openxmlformats.org/presentationml/2006/main" xmlns:m="http://schemas.openxmlformats.org/officeDocument/2006/math" xmlns:w="http://schemas.openxmlformats.org/wordprocessingml/2006/main" matchingName="" preserve="1" showMasterPhAnim="0" type="blank" userDrawn="1">
+<p:sldLayout xmlns:a="http://schemas.openxmlformats.org/drawingml/2006/main" xmlns:r="http://schemas.openxmlformats.org/officeDocument/2006/relationships" xmlns:p="http://schemas.openxmlformats.org/presentationml/2006/main" matchingName="" preserve="1" showMasterPhAnim="0" type="blank" userDrawn="1">
   <p:cSld name="Title Only">
     <p:spTree>
       <p:nvGrpSpPr>
-        <p:cNvPr id="1" name="" hidden="0"/>
+        <p:cNvPr id="1" name=""/>
         <p:cNvGrpSpPr/>
         <p:nvPr isPhoto="0" userDrawn="0"/>
       </p:nvGrpSpPr>
@@ -2264,7 +2229,7 @@
       </p:grpSpPr>
       <p:sp>
         <p:nvSpPr>
-          <p:cNvPr id="2" name="Title 1" hidden="0"/>
+          <p:cNvPr id="2" name="Title 1"/>
           <p:cNvSpPr/>
           <p:nvPr isPhoto="0" userDrawn="0">
             <p:ph type="title" hasCustomPrompt="0"/>
@@ -2288,7 +2253,7 @@
       </p:sp>
       <p:sp>
         <p:nvSpPr>
-          <p:cNvPr id="3" name="Date Placeholder 2" hidden="0"/>
+          <p:cNvPr id="3" name="Date Placeholder 2"/>
           <p:cNvSpPr/>
           <p:nvPr isPhoto="0" userDrawn="0">
             <p:ph type="dt" sz="half" idx="10" hasCustomPrompt="0"/>
@@ -2305,17 +2270,13 @@
             <a:fld id="{8EC678CE-9857-4734-9115-53321CEB7787}" type="datetimeFigureOut">
               <a:t>3/27/2014</a:t>
             </a:fld>
-            <a:r>
-              <a:rPr/>
-              <a:t>27.03.201424.06.201413.08.201418.08.2014</a:t>
-            </a:r>
-            <a:endParaRPr/>
-          </a:p>
-        </p:txBody>
-      </p:sp>
-      <p:sp>
-        <p:nvSpPr>
-          <p:cNvPr id="4" name="Footer Placeholder 3" hidden="0"/>
+            <a:endParaRPr/>
+          </a:p>
+        </p:txBody>
+      </p:sp>
+      <p:sp>
+        <p:nvSpPr>
+          <p:cNvPr id="4" name="Footer Placeholder 3"/>
           <p:cNvSpPr/>
           <p:nvPr isPhoto="0" userDrawn="0">
             <p:ph type="ftr" sz="quarter" idx="11" hasCustomPrompt="0"/>
@@ -2335,7 +2296,7 @@
       </p:sp>
       <p:sp>
         <p:nvSpPr>
-          <p:cNvPr id="5" name="Slide Number Placeholder 4" hidden="0"/>
+          <p:cNvPr id="5" name="Slide Number Placeholder 4"/>
           <p:cNvSpPr/>
           <p:nvPr isPhoto="0" userDrawn="0">
             <p:ph type="sldNum" sz="quarter" idx="12" hasCustomPrompt="0"/>
@@ -2361,16 +2322,15 @@
   <p:clrMapOvr>
     <a:masterClrMapping/>
   </p:clrMapOvr>
-  <p:hf dt="1" ftr="1" hdr="1" sldNum="1"/>
 </p:sldLayout>
 </file>
 
 <file path=ppt/slideLayouts/slideLayout7.xml><?xml version="1.0" encoding="utf-8"?>
-<p:sldLayout xmlns:a="http://schemas.openxmlformats.org/drawingml/2006/main" xmlns:r="http://schemas.openxmlformats.org/officeDocument/2006/relationships" xmlns:p="http://schemas.openxmlformats.org/presentationml/2006/main" xmlns:m="http://schemas.openxmlformats.org/officeDocument/2006/math" xmlns:w="http://schemas.openxmlformats.org/wordprocessingml/2006/main" matchingName="" preserve="1" showMasterPhAnim="0" type="blank" userDrawn="1">
+<p:sldLayout xmlns:a="http://schemas.openxmlformats.org/drawingml/2006/main" xmlns:r="http://schemas.openxmlformats.org/officeDocument/2006/relationships" xmlns:p="http://schemas.openxmlformats.org/presentationml/2006/main" matchingName="" preserve="1" showMasterPhAnim="0" type="blank" userDrawn="1">
   <p:cSld name="Blank">
     <p:spTree>
       <p:nvGrpSpPr>
-        <p:cNvPr id="1" name="" hidden="0"/>
+        <p:cNvPr id="1" name=""/>
         <p:cNvGrpSpPr/>
         <p:nvPr isPhoto="0" userDrawn="0"/>
       </p:nvGrpSpPr>
@@ -2384,7 +2344,7 @@
       </p:grpSpPr>
       <p:sp>
         <p:nvSpPr>
-          <p:cNvPr id="2" name="Date Placeholder 1" hidden="0"/>
+          <p:cNvPr id="2" name="Date Placeholder 1"/>
           <p:cNvSpPr/>
           <p:nvPr isPhoto="0" userDrawn="0">
             <p:ph type="dt" sz="half" idx="10" hasCustomPrompt="0"/>
@@ -2401,17 +2361,13 @@
             <a:fld id="{8EC678CE-9857-4734-9115-53321CEB7787}" type="datetimeFigureOut">
               <a:t>3/27/2014</a:t>
             </a:fld>
-            <a:r>
-              <a:rPr/>
-              <a:t>27.03.201424.06.201413.08.201418.08.2014</a:t>
-            </a:r>
-            <a:endParaRPr/>
-          </a:p>
-        </p:txBody>
-      </p:sp>
-      <p:sp>
-        <p:nvSpPr>
-          <p:cNvPr id="3" name="Footer Placeholder 2" hidden="0"/>
+            <a:endParaRPr/>
+          </a:p>
+        </p:txBody>
+      </p:sp>
+      <p:sp>
+        <p:nvSpPr>
+          <p:cNvPr id="3" name="Footer Placeholder 2"/>
           <p:cNvSpPr/>
           <p:nvPr isPhoto="0" userDrawn="0">
             <p:ph type="ftr" sz="quarter" idx="11" hasCustomPrompt="0"/>
@@ -2431,7 +2387,7 @@
       </p:sp>
       <p:sp>
         <p:nvSpPr>
-          <p:cNvPr id="4" name="Slide Number Placeholder 3" hidden="0"/>
+          <p:cNvPr id="4" name="Slide Number Placeholder 3"/>
           <p:cNvSpPr/>
           <p:nvPr isPhoto="0" userDrawn="0">
             <p:ph type="sldNum" sz="quarter" idx="12" hasCustomPrompt="0"/>
@@ -2457,16 +2413,15 @@
   <p:clrMapOvr>
     <a:masterClrMapping/>
   </p:clrMapOvr>
-  <p:hf dt="1" ftr="1" hdr="1" sldNum="1"/>
 </p:sldLayout>
 </file>
 
 <file path=ppt/slideLayouts/slideLayout8.xml><?xml version="1.0" encoding="utf-8"?>
-<p:sldLayout xmlns:a="http://schemas.openxmlformats.org/drawingml/2006/main" xmlns:r="http://schemas.openxmlformats.org/officeDocument/2006/relationships" xmlns:p="http://schemas.openxmlformats.org/presentationml/2006/main" xmlns:m="http://schemas.openxmlformats.org/officeDocument/2006/math" xmlns:w="http://schemas.openxmlformats.org/wordprocessingml/2006/main" matchingName="" preserve="1" showMasterPhAnim="0" type="blank" userDrawn="1">
+<p:sldLayout xmlns:a="http://schemas.openxmlformats.org/drawingml/2006/main" xmlns:r="http://schemas.openxmlformats.org/officeDocument/2006/relationships" xmlns:p="http://schemas.openxmlformats.org/presentationml/2006/main" matchingName="" preserve="1" showMasterPhAnim="0" type="blank" userDrawn="1">
   <p:cSld name="Content with Caption">
     <p:spTree>
       <p:nvGrpSpPr>
-        <p:cNvPr id="1" name="" hidden="0"/>
+        <p:cNvPr id="1" name=""/>
         <p:cNvGrpSpPr/>
         <p:nvPr isPhoto="0" userDrawn="0"/>
       </p:nvGrpSpPr>
@@ -2480,7 +2435,7 @@
       </p:grpSpPr>
       <p:sp>
         <p:nvSpPr>
-          <p:cNvPr id="2" name="Title 1" hidden="0"/>
+          <p:cNvPr id="2" name="Title 1"/>
           <p:cNvSpPr/>
           <p:nvPr isPhoto="0" userDrawn="0">
             <p:ph type="title" hasCustomPrompt="0"/>
@@ -2513,7 +2468,7 @@
       </p:sp>
       <p:sp>
         <p:nvSpPr>
-          <p:cNvPr id="3" name="Content Placeholder 2" hidden="0"/>
+          <p:cNvPr id="3" name="Content Placeholder 2"/>
           <p:cNvSpPr/>
           <p:nvPr isPhoto="0" userDrawn="0">
             <p:ph idx="1" hasCustomPrompt="0"/>
@@ -2610,7 +2565,7 @@
       </p:sp>
       <p:sp>
         <p:nvSpPr>
-          <p:cNvPr id="4" name="Text Placeholder 3" hidden="0"/>
+          <p:cNvPr id="4" name="Text Placeholder 3"/>
           <p:cNvSpPr/>
           <p:nvPr isPhoto="0" userDrawn="0">
             <p:ph type="body" sz="half" idx="2" hasCustomPrompt="0"/>
@@ -2676,7 +2631,7 @@
       </p:sp>
       <p:sp>
         <p:nvSpPr>
-          <p:cNvPr id="5" name="Date Placeholder 4" hidden="0"/>
+          <p:cNvPr id="5" name="Date Placeholder 4"/>
           <p:cNvSpPr/>
           <p:nvPr isPhoto="0" userDrawn="0">
             <p:ph type="dt" sz="half" idx="10" hasCustomPrompt="0"/>
@@ -2693,17 +2648,13 @@
             <a:fld id="{8EC678CE-9857-4734-9115-53321CEB7787}" type="datetimeFigureOut">
               <a:t>3/27/2014</a:t>
             </a:fld>
-            <a:r>
-              <a:rPr/>
-              <a:t>27.03.201424.06.201413.08.201418.08.2014</a:t>
-            </a:r>
-            <a:endParaRPr/>
-          </a:p>
-        </p:txBody>
-      </p:sp>
-      <p:sp>
-        <p:nvSpPr>
-          <p:cNvPr id="6" name="Footer Placeholder 5" hidden="0"/>
+            <a:endParaRPr/>
+          </a:p>
+        </p:txBody>
+      </p:sp>
+      <p:sp>
+        <p:nvSpPr>
+          <p:cNvPr id="6" name="Footer Placeholder 5"/>
           <p:cNvSpPr/>
           <p:nvPr isPhoto="0" userDrawn="0">
             <p:ph type="ftr" sz="quarter" idx="11" hasCustomPrompt="0"/>
@@ -2723,7 +2674,7 @@
       </p:sp>
       <p:sp>
         <p:nvSpPr>
-          <p:cNvPr id="7" name="Slide Number Placeholder 6" hidden="0"/>
+          <p:cNvPr id="7" name="Slide Number Placeholder 6"/>
           <p:cNvSpPr/>
           <p:nvPr isPhoto="0" userDrawn="0">
             <p:ph type="sldNum" sz="quarter" idx="12" hasCustomPrompt="0"/>
@@ -2749,16 +2700,15 @@
   <p:clrMapOvr>
     <a:masterClrMapping/>
   </p:clrMapOvr>
-  <p:hf dt="1" ftr="1" hdr="1" sldNum="1"/>
 </p:sldLayout>
 </file>
 
 <file path=ppt/slideLayouts/slideLayout9.xml><?xml version="1.0" encoding="utf-8"?>
-<p:sldLayout xmlns:a="http://schemas.openxmlformats.org/drawingml/2006/main" xmlns:r="http://schemas.openxmlformats.org/officeDocument/2006/relationships" xmlns:p="http://schemas.openxmlformats.org/presentationml/2006/main" xmlns:m="http://schemas.openxmlformats.org/officeDocument/2006/math" xmlns:w="http://schemas.openxmlformats.org/wordprocessingml/2006/main" matchingName="" preserve="1" showMasterPhAnim="0" type="blank" userDrawn="1">
+<p:sldLayout xmlns:a="http://schemas.openxmlformats.org/drawingml/2006/main" xmlns:r="http://schemas.openxmlformats.org/officeDocument/2006/relationships" xmlns:p="http://schemas.openxmlformats.org/presentationml/2006/main" matchingName="" preserve="1" showMasterPhAnim="0" type="blank" userDrawn="1">
   <p:cSld name="Picture with Caption">
     <p:spTree>
       <p:nvGrpSpPr>
-        <p:cNvPr id="1" name="" hidden="0"/>
+        <p:cNvPr id="1" name=""/>
         <p:cNvGrpSpPr/>
         <p:nvPr isPhoto="0" userDrawn="0"/>
       </p:nvGrpSpPr>
@@ -2772,7 +2722,7 @@
       </p:grpSpPr>
       <p:sp>
         <p:nvSpPr>
-          <p:cNvPr id="2" name="Title 1" hidden="0"/>
+          <p:cNvPr id="2" name="Title 1"/>
           <p:cNvSpPr/>
           <p:nvPr isPhoto="0" userDrawn="0">
             <p:ph type="title" hasCustomPrompt="0"/>
@@ -2805,7 +2755,7 @@
       </p:sp>
       <p:sp>
         <p:nvSpPr>
-          <p:cNvPr id="3" name="Picture Placeholder 2" hidden="0"/>
+          <p:cNvPr id="3" name="Picture Placeholder 2"/>
           <p:cNvSpPr/>
           <p:nvPr isPhoto="0" userDrawn="0">
             <p:ph type="pic" idx="1" hasCustomPrompt="0"/>
@@ -2871,7 +2821,7 @@
       </p:sp>
       <p:sp>
         <p:nvSpPr>
-          <p:cNvPr id="4" name="Text Placeholder 3" hidden="0"/>
+          <p:cNvPr id="4" name="Text Placeholder 3"/>
           <p:cNvSpPr/>
           <p:nvPr isPhoto="0" userDrawn="0">
             <p:ph type="body" sz="half" idx="2" hasCustomPrompt="0"/>
@@ -2937,7 +2887,7 @@
       </p:sp>
       <p:sp>
         <p:nvSpPr>
-          <p:cNvPr id="5" name="Date Placeholder 4" hidden="0"/>
+          <p:cNvPr id="5" name="Date Placeholder 4"/>
           <p:cNvSpPr/>
           <p:nvPr isPhoto="0" userDrawn="0">
             <p:ph type="dt" sz="half" idx="10" hasCustomPrompt="0"/>
@@ -2954,17 +2904,13 @@
             <a:fld id="{8EC678CE-9857-4734-9115-53321CEB7787}" type="datetimeFigureOut">
               <a:t>3/27/2014</a:t>
             </a:fld>
-            <a:r>
-              <a:rPr/>
-              <a:t>27.03.201424.06.201413.08.201418.08.2014</a:t>
-            </a:r>
-            <a:endParaRPr/>
-          </a:p>
-        </p:txBody>
-      </p:sp>
-      <p:sp>
-        <p:nvSpPr>
-          <p:cNvPr id="6" name="Footer Placeholder 5" hidden="0"/>
+            <a:endParaRPr/>
+          </a:p>
+        </p:txBody>
+      </p:sp>
+      <p:sp>
+        <p:nvSpPr>
+          <p:cNvPr id="6" name="Footer Placeholder 5"/>
           <p:cNvSpPr/>
           <p:nvPr isPhoto="0" userDrawn="0">
             <p:ph type="ftr" sz="quarter" idx="11" hasCustomPrompt="0"/>
@@ -2984,7 +2930,7 @@
       </p:sp>
       <p:sp>
         <p:nvSpPr>
-          <p:cNvPr id="7" name="Slide Number Placeholder 6" hidden="0"/>
+          <p:cNvPr id="7" name="Slide Number Placeholder 6"/>
           <p:cNvSpPr/>
           <p:nvPr isPhoto="0" userDrawn="0">
             <p:ph type="sldNum" sz="quarter" idx="12" hasCustomPrompt="0"/>
@@ -3010,12 +2956,11 @@
   <p:clrMapOvr>
     <a:masterClrMapping/>
   </p:clrMapOvr>
-  <p:hf dt="1" ftr="1" hdr="1" sldNum="1"/>
 </p:sldLayout>
 </file>
 
 <file path=ppt/slideMasters/slideMaster1.xml><?xml version="1.0" encoding="utf-8"?>
-<p:sldMaster xmlns:a="http://schemas.openxmlformats.org/drawingml/2006/main" xmlns:r="http://schemas.openxmlformats.org/officeDocument/2006/relationships" xmlns:p="http://schemas.openxmlformats.org/presentationml/2006/main" xmlns:m="http://schemas.openxmlformats.org/officeDocument/2006/math" xmlns:w="http://schemas.openxmlformats.org/wordprocessingml/2006/main" preserve="0">
+<p:sldMaster xmlns:a="http://schemas.openxmlformats.org/drawingml/2006/main" xmlns:r="http://schemas.openxmlformats.org/officeDocument/2006/relationships" xmlns:p="http://schemas.openxmlformats.org/presentationml/2006/main" preserve="0">
   <p:cSld name="">
     <p:bg>
       <p:bgPr shadeToTitle="0">
@@ -3027,7 +2972,7 @@
     </p:bg>
     <p:spTree>
       <p:nvGrpSpPr>
-        <p:cNvPr id="1" name="" hidden="0"/>
+        <p:cNvPr id="1" name=""/>
         <p:cNvGrpSpPr/>
         <p:nvPr isPhoto="0" userDrawn="0"/>
       </p:nvGrpSpPr>
@@ -3041,7 +2986,7 @@
       </p:grpSpPr>
       <p:sp>
         <p:nvSpPr>
-          <p:cNvPr id="2" name="Title Placeholder 1" hidden="0"/>
+          <p:cNvPr id="2" name="Title Placeholder 1"/>
           <p:cNvSpPr/>
           <p:nvPr isPhoto="0" userDrawn="0">
             <p:ph type="title" hasCustomPrompt="0"/>
@@ -3073,7 +3018,7 @@
       </p:sp>
       <p:sp>
         <p:nvSpPr>
-          <p:cNvPr id="3" name="Text Placeholder 2" hidden="0"/>
+          <p:cNvPr id="3" name="Text Placeholder 2"/>
           <p:cNvSpPr/>
           <p:nvPr isPhoto="0" userDrawn="0">
             <p:ph type="body" idx="1" hasCustomPrompt="0"/>
@@ -3145,7 +3090,7 @@
       </p:sp>
       <p:sp>
         <p:nvSpPr>
-          <p:cNvPr id="4" name="Date Placeholder 3" hidden="0"/>
+          <p:cNvPr id="4" name="Date Placeholder 3"/>
           <p:cNvSpPr/>
           <p:nvPr isPhoto="0" userDrawn="0">
             <p:ph type="dt" sz="half" idx="2" hasCustomPrompt="0"/>
@@ -3186,7 +3131,7 @@
       </p:sp>
       <p:sp>
         <p:nvSpPr>
-          <p:cNvPr id="5" name="Footer Placeholder 4" hidden="0"/>
+          <p:cNvPr id="5" name="Footer Placeholder 4"/>
           <p:cNvSpPr/>
           <p:nvPr isPhoto="0" userDrawn="0">
             <p:ph type="ftr" sz="quarter" idx="3" hasCustomPrompt="0"/>
@@ -3224,7 +3169,7 @@
       </p:sp>
       <p:sp>
         <p:nvSpPr>
-          <p:cNvPr id="6" name="Slide Number Placeholder 5" hidden="0"/>
+          <p:cNvPr id="6" name="Slide Number Placeholder 5"/>
           <p:cNvSpPr/>
           <p:nvPr isPhoto="0" userDrawn="0">
             <p:ph type="sldNum" sz="quarter" idx="4" hasCustomPrompt="0"/>
@@ -3265,7 +3210,7 @@
       </p:sp>
     </p:spTree>
   </p:cSld>
-  <p:clrMap accent1="accent1" accent2="accent2" accent3="accent3" accent4="accent4" accent5="accent5" accent6="accent6" bg1="lt1" bg2="lt2" folHlink="folHlink" hlink="hlink" tx1="dk1" tx2="dk2"/>
+  <p:clrMap folHlink="folHlink" accent1="accent1" bg1="lt1" accent2="accent2" tx1="dk1" bg2="lt2" accent3="accent3" tx2="dk2" accent4="accent4" hlink="hlink" accent5="accent5" accent6="accent6"/>
   <p:sldLayoutIdLst>
     <p:sldLayoutId id="2147483649" r:id="rId1"/>
     <p:sldLayoutId id="2147483650" r:id="rId2"/>
@@ -3279,7 +3224,6 @@
     <p:sldLayoutId id="2147483658" r:id="rId10"/>
     <p:sldLayoutId id="2147483659" r:id="rId11"/>
   </p:sldLayoutIdLst>
-  <p:hf dt="1" ftr="1" hdr="1" sldNum="1"/>
   <p:txStyles>
     <p:titleStyle>
       <a:lvl1pPr algn="l">
@@ -3526,7 +3470,7 @@
 </file>
 
 <file path=ppt/slides/slide1.xml><?xml version="1.0" encoding="utf-8"?>
-<p:sld xmlns:a="http://schemas.openxmlformats.org/drawingml/2006/main" xmlns:r="http://schemas.openxmlformats.org/officeDocument/2006/relationships" xmlns:p="http://schemas.openxmlformats.org/presentationml/2006/main" xmlns:m="http://schemas.openxmlformats.org/officeDocument/2006/math" xmlns:w="http://schemas.openxmlformats.org/wordprocessingml/2006/main" showMasterPhAnim="0" show="1">
+<p:sld xmlns:a="http://schemas.openxmlformats.org/drawingml/2006/main" xmlns:r="http://schemas.openxmlformats.org/officeDocument/2006/relationships" xmlns:p="http://schemas.openxmlformats.org/presentationml/2006/main" showMasterPhAnim="0" show="1">
   <p:cSld name="">
     <p:bg>
       <p:bgPr shadeToTitle="0">
@@ -3538,7 +3482,7 @@
     </p:bg>
     <p:spTree>
       <p:nvGrpSpPr>
-        <p:cNvPr id="1" name="" hidden="0"/>
+        <p:cNvPr id="1" name=""/>
         <p:cNvGrpSpPr/>
         <p:nvPr isPhoto="0" userDrawn="0"/>
       </p:nvGrpSpPr>
@@ -3552,7 +3496,7 @@
       </p:grpSpPr>
       <p:sp>
         <p:nvSpPr>
-          <p:cNvPr id="2" name="Title 1" hidden="0"/>
+          <p:cNvPr id="2" name="Title 1"/>
           <p:cNvSpPr/>
           <p:nvPr isPhoto="0" userDrawn="0">
             <p:ph type="ctrTitle" hasCustomPrompt="0"/>
@@ -3570,16 +3514,24 @@
               <a:rPr sz="8000" b="1"/>
               <a:t>How They </a:t>
             </a:r>
-            <a:br>
-              <a:rPr/>
-            </a:br>
+            <a:r>
+              <a:rPr sz="8000"/>
+              <a:t/>
+            </a:r>
+            <a:r>
+              <a:rPr sz="8000"/>
+              <a:t/>
+            </a:r>
+            <a:br/>
             <a:r>
               <a:rPr sz="6600"/>
               <a:t>Throw Out</a:t>
             </a:r>
-            <a:br>
-              <a:rPr/>
-            </a:br>
+            <a:r>
+              <a:rPr sz="6600"/>
+              <a:t/>
+            </a:r>
+            <a:br/>
             <a:r>
               <a:rPr sz="6600"/>
               <a:t>a Challenge</a:t>
@@ -3609,7 +3561,7 @@
 </file>
 
 <file path=ppt/slides/slide2.xml><?xml version="1.0" encoding="utf-8"?>
-<p:sld xmlns:a="http://schemas.openxmlformats.org/drawingml/2006/main" xmlns:r="http://schemas.openxmlformats.org/officeDocument/2006/relationships" xmlns:p="http://schemas.openxmlformats.org/presentationml/2006/main" xmlns:m="http://schemas.openxmlformats.org/officeDocument/2006/math" xmlns:w="http://schemas.openxmlformats.org/wordprocessingml/2006/main" showMasterPhAnim="0" show="1">
+<p:sld xmlns:a="http://schemas.openxmlformats.org/drawingml/2006/main" xmlns:r="http://schemas.openxmlformats.org/officeDocument/2006/relationships" xmlns:p="http://schemas.openxmlformats.org/presentationml/2006/main" showMasterPhAnim="0" show="1">
   <p:cSld name="">
     <p:bg>
       <p:bgPr shadeToTitle="0">
@@ -3621,7 +3573,7 @@
     </p:bg>
     <p:spTree>
       <p:nvGrpSpPr>
-        <p:cNvPr id="1" name="" hidden="0"/>
+        <p:cNvPr id="1" name=""/>
         <p:cNvGrpSpPr/>
         <p:nvPr isPhoto="0" userDrawn="0"/>
       </p:nvGrpSpPr>
@@ -3635,7 +3587,7 @@
       </p:grpSpPr>
       <p:sp>
         <p:nvSpPr>
-          <p:cNvPr id="4" name="Title 3" hidden="0"/>
+          <p:cNvPr id="4" name="Title 3"/>
           <p:cNvSpPr/>
           <p:nvPr isPhoto="0" userDrawn="0">
             <p:ph type="title" hasCustomPrompt="0"/>
@@ -3663,7 +3615,7 @@
       </p:sp>
       <p:sp>
         <p:nvSpPr>
-          <p:cNvPr id="5" name="Text Placeholder 4" hidden="0"/>
+          <p:cNvPr id="5" name="Text Placeholder 4"/>
           <p:cNvSpPr/>
           <p:nvPr isPhoto="0" userDrawn="0">
             <p:ph type="body" idx="1" hasCustomPrompt="0"/>
@@ -3727,7 +3679,7 @@
 </file>
 
 <file path=ppt/slides/slide3.xml><?xml version="1.0" encoding="utf-8"?>
-<p:sld xmlns:a="http://schemas.openxmlformats.org/drawingml/2006/main" xmlns:r="http://schemas.openxmlformats.org/officeDocument/2006/relationships" xmlns:p="http://schemas.openxmlformats.org/presentationml/2006/main" xmlns:m="http://schemas.openxmlformats.org/officeDocument/2006/math" xmlns:w="http://schemas.openxmlformats.org/wordprocessingml/2006/main" showMasterPhAnim="0" show="1">
+<p:sld xmlns:a="http://schemas.openxmlformats.org/drawingml/2006/main" xmlns:r="http://schemas.openxmlformats.org/officeDocument/2006/relationships" xmlns:p="http://schemas.openxmlformats.org/presentationml/2006/main" showMasterPhAnim="0" show="1">
   <p:cSld name="">
     <p:bg>
       <p:bgPr shadeToTitle="0">
@@ -3739,7 +3691,7 @@
     </p:bg>
     <p:spTree>
       <p:nvGrpSpPr>
-        <p:cNvPr id="1" name="" hidden="0"/>
+        <p:cNvPr id="1" name=""/>
         <p:cNvGrpSpPr/>
         <p:nvPr isPhoto="0" userDrawn="0"/>
       </p:nvGrpSpPr>
@@ -3753,7 +3705,7 @@
       </p:grpSpPr>
       <p:sp>
         <p:nvSpPr>
-          <p:cNvPr id="2" name="Title 1" hidden="0"/>
+          <p:cNvPr id="2" name="Title 1"/>
           <p:cNvSpPr/>
           <p:nvPr isPhoto="0" userDrawn="0">
             <p:ph type="title" hasCustomPrompt="0"/>
@@ -3771,9 +3723,11 @@
               <a:rPr b="1"/>
               <a:t>European Knights</a:t>
             </a:r>
-            <a:br>
-              <a:rPr/>
-            </a:br>
+            <a:r>
+              <a:rPr b="1"/>
+              <a:t/>
+            </a:r>
+            <a:br/>
             <a:r>
               <a:rPr sz="4800"/>
               <a:t>(XII-XVI centuries)</a:t>
@@ -3784,7 +3738,7 @@
       </p:sp>
       <p:sp>
         <p:nvSpPr>
-          <p:cNvPr id="3" name="Text Placeholder 2" hidden="0"/>
+          <p:cNvPr id="3" name="Text Placeholder 2"/>
           <p:cNvSpPr/>
           <p:nvPr isPhoto="0" userDrawn="0">
             <p:ph type="body" idx="1" hasCustomPrompt="0"/>
@@ -3843,7 +3797,7 @@
 </file>
 
 <file path=ppt/slides/slide4.xml><?xml version="1.0" encoding="utf-8"?>
-<p:sld xmlns:a="http://schemas.openxmlformats.org/drawingml/2006/main" xmlns:r="http://schemas.openxmlformats.org/officeDocument/2006/relationships" xmlns:p="http://schemas.openxmlformats.org/presentationml/2006/main" xmlns:m="http://schemas.openxmlformats.org/officeDocument/2006/math" xmlns:w="http://schemas.openxmlformats.org/wordprocessingml/2006/main" showMasterPhAnim="0" show="1">
+<p:sld xmlns:a="http://schemas.openxmlformats.org/drawingml/2006/main" xmlns:r="http://schemas.openxmlformats.org/officeDocument/2006/relationships" xmlns:p="http://schemas.openxmlformats.org/presentationml/2006/main" showMasterPhAnim="0" show="1">
   <p:cSld name="">
     <p:bg>
       <p:bgPr shadeToTitle="0">
@@ -3855,7 +3809,7 @@
     </p:bg>
     <p:spTree>
       <p:nvGrpSpPr>
-        <p:cNvPr id="1" name="" hidden="0"/>
+        <p:cNvPr id="1" name=""/>
         <p:cNvGrpSpPr/>
         <p:nvPr isPhoto="0" userDrawn="0"/>
       </p:nvGrpSpPr>
@@ -3869,7 +3823,7 @@
       </p:grpSpPr>
       <p:sp>
         <p:nvSpPr>
-          <p:cNvPr id="2" name="Title 1" hidden="0"/>
+          <p:cNvPr id="2" name="Title 1"/>
           <p:cNvSpPr/>
           <p:nvPr isPhoto="0" userDrawn="0">
             <p:ph type="title" hasCustomPrompt="0"/>
@@ -3892,16 +3846,18 @@
               <a:rPr b="1"/>
               <a:t>African Yoruba tribes</a:t>
             </a:r>
-            <a:br>
-              <a:rPr/>
-            </a:br>
+            <a:r>
+              <a:rPr b="1"/>
+              <a:t/>
+            </a:r>
+            <a:br/>
             <a:endParaRPr b="1"/>
           </a:p>
         </p:txBody>
       </p:sp>
       <p:sp>
         <p:nvSpPr>
-          <p:cNvPr id="3" name="Text Placeholder 2" hidden="0"/>
+          <p:cNvPr id="3" name="Text Placeholder 2"/>
           <p:cNvSpPr/>
           <p:nvPr isPhoto="0" userDrawn="0">
             <p:ph type="body" idx="1" hasCustomPrompt="0"/>
@@ -3974,7 +3930,7 @@
 </file>
 
 <file path=ppt/slides/slide5.xml><?xml version="1.0" encoding="utf-8"?>
-<p:sld xmlns:a="http://schemas.openxmlformats.org/drawingml/2006/main" xmlns:r="http://schemas.openxmlformats.org/officeDocument/2006/relationships" xmlns:p="http://schemas.openxmlformats.org/presentationml/2006/main" xmlns:m="http://schemas.openxmlformats.org/officeDocument/2006/math" xmlns:w="http://schemas.openxmlformats.org/wordprocessingml/2006/main" showMasterPhAnim="0" show="1">
+<p:sld xmlns:a="http://schemas.openxmlformats.org/drawingml/2006/main" xmlns:r="http://schemas.openxmlformats.org/officeDocument/2006/relationships" xmlns:p="http://schemas.openxmlformats.org/presentationml/2006/main" showMasterPhAnim="0" show="1">
   <p:cSld name="">
     <p:bg>
       <p:bgPr shadeToTitle="0">
@@ -3986,7 +3942,7 @@
     </p:bg>
     <p:spTree>
       <p:nvGrpSpPr>
-        <p:cNvPr id="1" name="" hidden="0"/>
+        <p:cNvPr id="1" name=""/>
         <p:cNvGrpSpPr/>
         <p:nvPr isPhoto="0" userDrawn="0"/>
       </p:nvGrpSpPr>
@@ -4000,7 +3956,7 @@
       </p:grpSpPr>
       <p:sp>
         <p:nvSpPr>
-          <p:cNvPr id="2" name="Title 1" hidden="0"/>
+          <p:cNvPr id="2" name="Title 1"/>
           <p:cNvSpPr/>
           <p:nvPr isPhoto="0" userDrawn="0">
             <p:ph type="title" hasCustomPrompt="0"/>
@@ -4018,9 +3974,11 @@
               <a:rPr b="1"/>
               <a:t>English gentlemen</a:t>
             </a:r>
-            <a:br>
-              <a:rPr/>
-            </a:br>
+            <a:r>
+              <a:rPr b="1"/>
+              <a:t/>
+            </a:r>
+            <a:br/>
             <a:r>
               <a:rPr sz="4800"/>
               <a:t>(XVII century)</a:t>
@@ -4031,7 +3989,7 @@
       </p:sp>
       <p:sp>
         <p:nvSpPr>
-          <p:cNvPr id="3" name="Text Placeholder 2" hidden="0"/>
+          <p:cNvPr id="3" name="Text Placeholder 2"/>
           <p:cNvSpPr/>
           <p:nvPr isPhoto="0" userDrawn="0">
             <p:ph type="body" idx="1" hasCustomPrompt="0"/>
@@ -4090,7 +4048,7 @@
 </file>
 
 <file path=ppt/slides/slide6.xml><?xml version="1.0" encoding="utf-8"?>
-<p:sld xmlns:a="http://schemas.openxmlformats.org/drawingml/2006/main" xmlns:r="http://schemas.openxmlformats.org/officeDocument/2006/relationships" xmlns:p="http://schemas.openxmlformats.org/presentationml/2006/main" xmlns:m="http://schemas.openxmlformats.org/officeDocument/2006/math" xmlns:w="http://schemas.openxmlformats.org/wordprocessingml/2006/main" showMasterPhAnim="0" show="1">
+<p:sld xmlns:a="http://schemas.openxmlformats.org/drawingml/2006/main" xmlns:r="http://schemas.openxmlformats.org/officeDocument/2006/relationships" xmlns:p="http://schemas.openxmlformats.org/presentationml/2006/main" showMasterPhAnim="0" show="1">
   <p:cSld name="">
     <p:bg>
       <p:bgPr shadeToTitle="0">
@@ -4102,7 +4060,7 @@
     </p:bg>
     <p:spTree>
       <p:nvGrpSpPr>
-        <p:cNvPr id="1" name="" hidden="0"/>
+        <p:cNvPr id="1" name=""/>
         <p:cNvGrpSpPr/>
         <p:nvPr isPhoto="0" userDrawn="0"/>
       </p:nvGrpSpPr>
@@ -4116,7 +4074,7 @@
       </p:grpSpPr>
       <p:sp>
         <p:nvSpPr>
-          <p:cNvPr id="2" name="Title 1" hidden="0"/>
+          <p:cNvPr id="2" name="Title 1"/>
           <p:cNvSpPr/>
           <p:nvPr isPhoto="0" userDrawn="0">
             <p:ph type="title" hasCustomPrompt="0"/>
@@ -4134,9 +4092,11 @@
               <a:rPr sz="6000" b="1"/>
               <a:t>Japan samurais</a:t>
             </a:r>
-            <a:br>
-              <a:rPr/>
-            </a:br>
+            <a:r>
+              <a:rPr sz="6000" b="1"/>
+              <a:t/>
+            </a:r>
+            <a:br/>
             <a:r>
               <a:rPr sz="4800"/>
               <a:t>(XII-XVII centuries)</a:t>
@@ -4147,7 +4107,7 @@
       </p:sp>
       <p:sp>
         <p:nvSpPr>
-          <p:cNvPr id="3" name="Text Placeholder 2" hidden="0"/>
+          <p:cNvPr id="3" name="Text Placeholder 2"/>
           <p:cNvSpPr/>
           <p:nvPr isPhoto="0" userDrawn="0">
             <p:ph type="body" idx="1" hasCustomPrompt="0"/>
@@ -4221,7 +4181,7 @@
 </file>
 
 <file path=ppt/slides/slide7.xml><?xml version="1.0" encoding="utf-8"?>
-<p:sld xmlns:a="http://schemas.openxmlformats.org/drawingml/2006/main" xmlns:r="http://schemas.openxmlformats.org/officeDocument/2006/relationships" xmlns:p="http://schemas.openxmlformats.org/presentationml/2006/main" xmlns:m="http://schemas.openxmlformats.org/officeDocument/2006/math" xmlns:w="http://schemas.openxmlformats.org/wordprocessingml/2006/main" showMasterPhAnim="0" show="1">
+<p:sld xmlns:a="http://schemas.openxmlformats.org/drawingml/2006/main" xmlns:r="http://schemas.openxmlformats.org/officeDocument/2006/relationships" xmlns:p="http://schemas.openxmlformats.org/presentationml/2006/main" showMasterPhAnim="0" show="1">
   <p:cSld name="">
     <p:bg>
       <p:bgPr shadeToTitle="0">
@@ -4233,7 +4193,7 @@
     </p:bg>
     <p:spTree>
       <p:nvGrpSpPr>
-        <p:cNvPr id="1" name="" hidden="0"/>
+        <p:cNvPr id="1" name=""/>
         <p:cNvGrpSpPr/>
         <p:nvPr isPhoto="0" userDrawn="0"/>
       </p:nvGrpSpPr>
@@ -4247,7 +4207,7 @@
       </p:grpSpPr>
       <p:sp>
         <p:nvSpPr>
-          <p:cNvPr id="2" name="Title 1" hidden="0"/>
+          <p:cNvPr id="2" name="Title 1"/>
           <p:cNvSpPr/>
           <p:nvPr isPhoto="0" userDrawn="0">
             <p:ph type="title" hasCustomPrompt="0"/>
@@ -4265,9 +4225,11 @@
               <a:rPr sz="6000" b="1"/>
               <a:t>Office plankton</a:t>
             </a:r>
-            <a:br>
-              <a:rPr/>
-            </a:br>
+            <a:r>
+              <a:rPr sz="6000" b="1"/>
+              <a:t/>
+            </a:r>
+            <a:br/>
             <a:r>
               <a:rPr sz="4800"/>
               <a:t>(XXI century)</a:t>
@@ -4278,7 +4240,7 @@
       </p:sp>
       <p:sp>
         <p:nvSpPr>
-          <p:cNvPr id="3" name="Text Placeholder 2" hidden="0"/>
+          <p:cNvPr id="3" name="Text Placeholder 2"/>
           <p:cNvSpPr/>
           <p:nvPr isPhoto="0" userDrawn="0">
             <p:ph type="body" idx="1" hasCustomPrompt="0"/>
@@ -4347,11 +4309,11 @@
 </file>
 
 <file path=ppt/slides/slide8.xml><?xml version="1.0" encoding="utf-8"?>
-<p:sld xmlns:a="http://schemas.openxmlformats.org/drawingml/2006/main" xmlns:r="http://schemas.openxmlformats.org/officeDocument/2006/relationships" xmlns:p="http://schemas.openxmlformats.org/presentationml/2006/main" xmlns:m="http://schemas.openxmlformats.org/officeDocument/2006/math" xmlns:w="http://schemas.openxmlformats.org/wordprocessingml/2006/main" showMasterPhAnim="0" show="1">
+<p:sld xmlns:a="http://schemas.openxmlformats.org/drawingml/2006/main" xmlns:r="http://schemas.openxmlformats.org/officeDocument/2006/relationships" xmlns:p="http://schemas.openxmlformats.org/presentationml/2006/main" showMasterPhAnim="0" show="1">
   <p:cSld name="">
     <p:spTree>
       <p:nvGrpSpPr>
-        <p:cNvPr id="1" name="" hidden="0"/>
+        <p:cNvPr id="1" name=""/>
         <p:cNvGrpSpPr/>
         <p:nvPr isPhoto="0" userDrawn="0"/>
       </p:nvGrpSpPr>
@@ -4365,7 +4327,7 @@
       </p:grpSpPr>
       <p:sp>
         <p:nvSpPr>
-          <p:cNvPr id="4" name="Title 3" hidden="0"/>
+          <p:cNvPr id="4" name="Title 3"/>
           <p:cNvSpPr/>
           <p:nvPr isPhoto="0" userDrawn="0">
             <p:ph type="title" hasCustomPrompt="0"/>
@@ -4386,11 +4348,21 @@
             </a:pPr>
             <a:r>
               <a:rPr sz="8800"/>
+              <a:t/>
+            </a:r>
+            <a:r>
+              <a:rPr sz="8800"/>
               <a:t>ONLYOFFICE </a:t>
             </a:r>
-            <a:br>
-              <a:rPr/>
-            </a:br>
+            <a:r>
+              <a:rPr/>
+              <a:t/>
+            </a:r>
+            <a:r>
+              <a:rPr/>
+              <a:t/>
+            </a:r>
+            <a:br/>
             <a:r>
               <a:rPr sz="6600"/>
               <a:t>stands for Peace</a:t>
@@ -4401,7 +4373,7 @@
       </p:sp>
       <p:sp>
         <p:nvSpPr>
-          <p:cNvPr id="5" name="Content Placeholder 4" hidden="0"/>
+          <p:cNvPr id="5" name="Content Placeholder 4"/>
           <p:cNvSpPr/>
           <p:nvPr isPhoto="0" userDrawn="0">
             <p:ph idx="1" hasCustomPrompt="0"/>
@@ -4426,7 +4398,7 @@
                 <a:solidFill>
                   <a:schemeClr val="hlink"/>
                 </a:solidFill>
-                <a:hlinkClick r:id="rId3" tooltip=""/>
+                <a:hlinkClick r:id="rId3"/>
               </a:rPr>
               <a:t>www.onlyoffice.com</a:t>
             </a:r>

</xml_diff>